<commit_message>
Improved text. Länge zu Breite. Pushed start population in the correct direction
</commit_message>
<xml_diff>
--- a/img/Figures.pptx
+++ b/img/Figures.pptx
@@ -113,16 +113,56 @@
 </p:presentation>
 </file>
 
-<file path=ppt/revisionInfo.xml><?xml version="1.0" encoding="utf-8"?>
-<p1510:revInfo xmlns:a="http://schemas.openxmlformats.org/drawingml/2006/main" xmlns:r="http://schemas.openxmlformats.org/officeDocument/2006/relationships" xmlns:p1510="http://schemas.microsoft.com/office/powerpoint/2015/10/main">
-  <p1510:revLst>
-    <p1510:client id="{499E9126-C5E2-4C4F-8D3E-82BC3D3E87F9}" v="7" dt="2024-04-08T12:03:17.884"/>
-  </p1510:revLst>
-</p1510:revInfo>
-</file>
-
 <file path=ppt/changesInfos/changesInfo1.xml><?xml version="1.0" encoding="utf-8"?>
 <pc:chgInfo xmlns:a="http://schemas.openxmlformats.org/drawingml/2006/main" xmlns:r="http://schemas.openxmlformats.org/officeDocument/2006/relationships" xmlns:ac="http://schemas.microsoft.com/office/drawing/2013/main/command" xmlns:pc="http://schemas.microsoft.com/office/powerpoint/2013/main/command">
+  <pc:docChgLst>
+    <pc:chgData name="Matthias Blaschke" userId="57333a27-b77b-4ca3-9b02-ed5df3b78b1a" providerId="ADAL" clId="{ED4D699F-6598-44B3-B277-7A3AD8D590CD}"/>
+    <pc:docChg chg="modSld">
+      <pc:chgData name="Matthias Blaschke" userId="57333a27-b77b-4ca3-9b02-ed5df3b78b1a" providerId="ADAL" clId="{ED4D699F-6598-44B3-B277-7A3AD8D590CD}" dt="2024-04-17T09:23:36.741" v="284" actId="20577"/>
+      <pc:docMkLst>
+        <pc:docMk/>
+      </pc:docMkLst>
+      <pc:sldChg chg="modSp mod">
+        <pc:chgData name="Matthias Blaschke" userId="57333a27-b77b-4ca3-9b02-ed5df3b78b1a" providerId="ADAL" clId="{ED4D699F-6598-44B3-B277-7A3AD8D590CD}" dt="2024-04-17T09:23:36.741" v="284" actId="20577"/>
+        <pc:sldMkLst>
+          <pc:docMk/>
+          <pc:sldMk cId="957009525" sldId="257"/>
+        </pc:sldMkLst>
+        <pc:spChg chg="mod">
+          <ac:chgData name="Matthias Blaschke" userId="57333a27-b77b-4ca3-9b02-ed5df3b78b1a" providerId="ADAL" clId="{ED4D699F-6598-44B3-B277-7A3AD8D590CD}" dt="2024-04-17T09:23:36.741" v="284" actId="20577"/>
+          <ac:spMkLst>
+            <pc:docMk/>
+            <pc:sldMk cId="957009525" sldId="257"/>
+            <ac:spMk id="8" creationId="{9E44E206-BA1B-19BF-95C2-28D53591C8DD}"/>
+          </ac:spMkLst>
+        </pc:spChg>
+        <pc:spChg chg="mod">
+          <ac:chgData name="Matthias Blaschke" userId="57333a27-b77b-4ca3-9b02-ed5df3b78b1a" providerId="ADAL" clId="{ED4D699F-6598-44B3-B277-7A3AD8D590CD}" dt="2024-04-17T08:34:32.791" v="276" actId="20577"/>
+          <ac:spMkLst>
+            <pc:docMk/>
+            <pc:sldMk cId="957009525" sldId="257"/>
+            <ac:spMk id="9" creationId="{BE19EC52-0958-6D22-5341-34F0E5E1F366}"/>
+          </ac:spMkLst>
+        </pc:spChg>
+        <pc:spChg chg="mod">
+          <ac:chgData name="Matthias Blaschke" userId="57333a27-b77b-4ca3-9b02-ed5df3b78b1a" providerId="ADAL" clId="{ED4D699F-6598-44B3-B277-7A3AD8D590CD}" dt="2024-04-17T08:35:01.065" v="278" actId="14100"/>
+          <ac:spMkLst>
+            <pc:docMk/>
+            <pc:sldMk cId="957009525" sldId="257"/>
+            <ac:spMk id="11" creationId="{69A60E3D-E9C1-2AA1-D050-24BCE76EC2CF}"/>
+          </ac:spMkLst>
+        </pc:spChg>
+        <pc:spChg chg="mod">
+          <ac:chgData name="Matthias Blaschke" userId="57333a27-b77b-4ca3-9b02-ed5df3b78b1a" providerId="ADAL" clId="{ED4D699F-6598-44B3-B277-7A3AD8D590CD}" dt="2024-04-17T08:35:39.713" v="283"/>
+          <ac:spMkLst>
+            <pc:docMk/>
+            <pc:sldMk cId="957009525" sldId="257"/>
+            <ac:spMk id="14" creationId="{89059DAC-604B-2753-AD52-1576DD6130D8}"/>
+          </ac:spMkLst>
+        </pc:spChg>
+      </pc:sldChg>
+    </pc:docChg>
+  </pc:docChgLst>
   <pc:docChgLst>
     <pc:chgData name="Matthias Blaschke" userId="57333a27-b77b-4ca3-9b02-ed5df3b78b1a" providerId="ADAL" clId="{499E9126-C5E2-4C4F-8D3E-82BC3D3E87F9}"/>
     <pc:docChg chg="custSel addSld modSld">
@@ -512,7 +552,7 @@
           <a:p>
             <a:fld id="{8A27E5DD-822D-4EEE-8C0C-5DD8B9D0EAE7}" type="datetimeFigureOut">
               <a:rPr lang="en-US" smtClean="0"/>
-              <a:t>4/15/2024</a:t>
+              <a:t>4/17/2024</a:t>
             </a:fld>
             <a:endParaRPr lang="en-US"/>
           </a:p>
@@ -566,7 +606,7 @@
           <a:p>
             <a:fld id="{5B73404F-B5D3-4FC9-9848-63BDCC2DA104}" type="slidenum">
               <a:rPr lang="en-US" smtClean="0"/>
-              <a:t>‹#›</a:t>
+              <a:t>‹Nr.›</a:t>
             </a:fld>
             <a:endParaRPr lang="en-US"/>
           </a:p>
@@ -710,7 +750,7 @@
           <a:p>
             <a:fld id="{8A27E5DD-822D-4EEE-8C0C-5DD8B9D0EAE7}" type="datetimeFigureOut">
               <a:rPr lang="en-US" smtClean="0"/>
-              <a:t>4/15/2024</a:t>
+              <a:t>4/17/2024</a:t>
             </a:fld>
             <a:endParaRPr lang="en-US"/>
           </a:p>
@@ -764,7 +804,7 @@
           <a:p>
             <a:fld id="{5B73404F-B5D3-4FC9-9848-63BDCC2DA104}" type="slidenum">
               <a:rPr lang="en-US" smtClean="0"/>
-              <a:t>‹#›</a:t>
+              <a:t>‹Nr.›</a:t>
             </a:fld>
             <a:endParaRPr lang="en-US"/>
           </a:p>
@@ -918,7 +958,7 @@
           <a:p>
             <a:fld id="{8A27E5DD-822D-4EEE-8C0C-5DD8B9D0EAE7}" type="datetimeFigureOut">
               <a:rPr lang="en-US" smtClean="0"/>
-              <a:t>4/15/2024</a:t>
+              <a:t>4/17/2024</a:t>
             </a:fld>
             <a:endParaRPr lang="en-US"/>
           </a:p>
@@ -972,7 +1012,7 @@
           <a:p>
             <a:fld id="{5B73404F-B5D3-4FC9-9848-63BDCC2DA104}" type="slidenum">
               <a:rPr lang="en-US" smtClean="0"/>
-              <a:t>‹#›</a:t>
+              <a:t>‹Nr.›</a:t>
             </a:fld>
             <a:endParaRPr lang="en-US"/>
           </a:p>
@@ -1116,7 +1156,7 @@
           <a:p>
             <a:fld id="{8A27E5DD-822D-4EEE-8C0C-5DD8B9D0EAE7}" type="datetimeFigureOut">
               <a:rPr lang="en-US" smtClean="0"/>
-              <a:t>4/15/2024</a:t>
+              <a:t>4/17/2024</a:t>
             </a:fld>
             <a:endParaRPr lang="en-US"/>
           </a:p>
@@ -1170,7 +1210,7 @@
           <a:p>
             <a:fld id="{5B73404F-B5D3-4FC9-9848-63BDCC2DA104}" type="slidenum">
               <a:rPr lang="en-US" smtClean="0"/>
-              <a:t>‹#›</a:t>
+              <a:t>‹Nr.›</a:t>
             </a:fld>
             <a:endParaRPr lang="en-US"/>
           </a:p>
@@ -1391,7 +1431,7 @@
           <a:p>
             <a:fld id="{8A27E5DD-822D-4EEE-8C0C-5DD8B9D0EAE7}" type="datetimeFigureOut">
               <a:rPr lang="en-US" smtClean="0"/>
-              <a:t>4/15/2024</a:t>
+              <a:t>4/17/2024</a:t>
             </a:fld>
             <a:endParaRPr lang="en-US"/>
           </a:p>
@@ -1445,7 +1485,7 @@
           <a:p>
             <a:fld id="{5B73404F-B5D3-4FC9-9848-63BDCC2DA104}" type="slidenum">
               <a:rPr lang="en-US" smtClean="0"/>
-              <a:t>‹#›</a:t>
+              <a:t>‹Nr.›</a:t>
             </a:fld>
             <a:endParaRPr lang="en-US"/>
           </a:p>
@@ -1656,7 +1696,7 @@
           <a:p>
             <a:fld id="{8A27E5DD-822D-4EEE-8C0C-5DD8B9D0EAE7}" type="datetimeFigureOut">
               <a:rPr lang="en-US" smtClean="0"/>
-              <a:t>4/15/2024</a:t>
+              <a:t>4/17/2024</a:t>
             </a:fld>
             <a:endParaRPr lang="en-US"/>
           </a:p>
@@ -1710,7 +1750,7 @@
           <a:p>
             <a:fld id="{5B73404F-B5D3-4FC9-9848-63BDCC2DA104}" type="slidenum">
               <a:rPr lang="en-US" smtClean="0"/>
-              <a:t>‹#›</a:t>
+              <a:t>‹Nr.›</a:t>
             </a:fld>
             <a:endParaRPr lang="en-US"/>
           </a:p>
@@ -2068,7 +2108,7 @@
           <a:p>
             <a:fld id="{8A27E5DD-822D-4EEE-8C0C-5DD8B9D0EAE7}" type="datetimeFigureOut">
               <a:rPr lang="en-US" smtClean="0"/>
-              <a:t>4/15/2024</a:t>
+              <a:t>4/17/2024</a:t>
             </a:fld>
             <a:endParaRPr lang="en-US"/>
           </a:p>
@@ -2122,7 +2162,7 @@
           <a:p>
             <a:fld id="{5B73404F-B5D3-4FC9-9848-63BDCC2DA104}" type="slidenum">
               <a:rPr lang="en-US" smtClean="0"/>
-              <a:t>‹#›</a:t>
+              <a:t>‹Nr.›</a:t>
             </a:fld>
             <a:endParaRPr lang="en-US"/>
           </a:p>
@@ -2209,7 +2249,7 @@
           <a:p>
             <a:fld id="{8A27E5DD-822D-4EEE-8C0C-5DD8B9D0EAE7}" type="datetimeFigureOut">
               <a:rPr lang="en-US" smtClean="0"/>
-              <a:t>4/15/2024</a:t>
+              <a:t>4/17/2024</a:t>
             </a:fld>
             <a:endParaRPr lang="en-US"/>
           </a:p>
@@ -2263,7 +2303,7 @@
           <a:p>
             <a:fld id="{5B73404F-B5D3-4FC9-9848-63BDCC2DA104}" type="slidenum">
               <a:rPr lang="en-US" smtClean="0"/>
-              <a:t>‹#›</a:t>
+              <a:t>‹Nr.›</a:t>
             </a:fld>
             <a:endParaRPr lang="en-US"/>
           </a:p>
@@ -2322,7 +2362,7 @@
           <a:p>
             <a:fld id="{8A27E5DD-822D-4EEE-8C0C-5DD8B9D0EAE7}" type="datetimeFigureOut">
               <a:rPr lang="en-US" smtClean="0"/>
-              <a:t>4/15/2024</a:t>
+              <a:t>4/17/2024</a:t>
             </a:fld>
             <a:endParaRPr lang="en-US"/>
           </a:p>
@@ -2376,7 +2416,7 @@
           <a:p>
             <a:fld id="{5B73404F-B5D3-4FC9-9848-63BDCC2DA104}" type="slidenum">
               <a:rPr lang="en-US" smtClean="0"/>
-              <a:t>‹#›</a:t>
+              <a:t>‹Nr.›</a:t>
             </a:fld>
             <a:endParaRPr lang="en-US"/>
           </a:p>
@@ -2633,7 +2673,7 @@
           <a:p>
             <a:fld id="{8A27E5DD-822D-4EEE-8C0C-5DD8B9D0EAE7}" type="datetimeFigureOut">
               <a:rPr lang="en-US" smtClean="0"/>
-              <a:t>4/15/2024</a:t>
+              <a:t>4/17/2024</a:t>
             </a:fld>
             <a:endParaRPr lang="en-US"/>
           </a:p>
@@ -2687,7 +2727,7 @@
           <a:p>
             <a:fld id="{5B73404F-B5D3-4FC9-9848-63BDCC2DA104}" type="slidenum">
               <a:rPr lang="en-US" smtClean="0"/>
-              <a:t>‹#›</a:t>
+              <a:t>‹Nr.›</a:t>
             </a:fld>
             <a:endParaRPr lang="en-US"/>
           </a:p>
@@ -2921,7 +2961,7 @@
           <a:p>
             <a:fld id="{8A27E5DD-822D-4EEE-8C0C-5DD8B9D0EAE7}" type="datetimeFigureOut">
               <a:rPr lang="en-US" smtClean="0"/>
-              <a:t>4/15/2024</a:t>
+              <a:t>4/17/2024</a:t>
             </a:fld>
             <a:endParaRPr lang="en-US"/>
           </a:p>
@@ -2975,7 +3015,7 @@
           <a:p>
             <a:fld id="{5B73404F-B5D3-4FC9-9848-63BDCC2DA104}" type="slidenum">
               <a:rPr lang="en-US" smtClean="0"/>
-              <a:t>‹#›</a:t>
+              <a:t>‹Nr.›</a:t>
             </a:fld>
             <a:endParaRPr lang="en-US"/>
           </a:p>
@@ -3162,7 +3202,7 @@
           <a:p>
             <a:fld id="{8A27E5DD-822D-4EEE-8C0C-5DD8B9D0EAE7}" type="datetimeFigureOut">
               <a:rPr lang="en-US" smtClean="0"/>
-              <a:t>4/15/2024</a:t>
+              <a:t>4/17/2024</a:t>
             </a:fld>
             <a:endParaRPr lang="en-US"/>
           </a:p>
@@ -3252,7 +3292,7 @@
           <a:p>
             <a:fld id="{5B73404F-B5D3-4FC9-9848-63BDCC2DA104}" type="slidenum">
               <a:rPr lang="en-US" smtClean="0"/>
-              <a:t>‹#›</a:t>
+              <a:t>‹Nr.›</a:t>
             </a:fld>
             <a:endParaRPr lang="en-US"/>
           </a:p>
@@ -4664,8 +4704,8 @@
         </p:nvSpPr>
         <p:spPr>
           <a:xfrm>
-            <a:off x="5804018" y="210621"/>
-            <a:ext cx="4838504" cy="369332"/>
+            <a:off x="5804018" y="0"/>
+            <a:ext cx="5575180" cy="923330"/>
           </a:xfrm>
           <a:prstGeom prst="rect">
             <a:avLst/>
@@ -4673,7 +4713,7 @@
           <a:noFill/>
         </p:spPr>
         <p:txBody>
-          <a:bodyPr wrap="none" rtlCol="0">
+          <a:bodyPr wrap="square" rtlCol="0">
             <a:spAutoFit/>
           </a:bodyPr>
           <a:lstStyle/>
@@ -4696,7 +4736,7 @@
             </a:r>
             <a:r>
               <a:rPr lang="en-US" dirty="0" err="1"/>
-              <a:t>werden</a:t>
+              <a:t>wird</a:t>
             </a:r>
             <a:r>
               <a:rPr lang="en-US" dirty="0"/>
@@ -4704,7 +4744,7 @@
             </a:r>
             <a:r>
               <a:rPr lang="en-US" dirty="0" err="1"/>
-              <a:t>zufällig</a:t>
+              <a:t>eine</a:t>
             </a:r>
             <a:r>
               <a:rPr lang="en-US" dirty="0"/>
@@ -4712,7 +4752,7 @@
             </a:r>
             <a:r>
               <a:rPr lang="en-US" dirty="0" err="1"/>
-              <a:t>Individuen</a:t>
+              <a:t>bestimmte</a:t>
             </a:r>
             <a:r>
               <a:rPr lang="en-US" dirty="0"/>
@@ -4720,11 +4760,67 @@
             </a:r>
             <a:r>
               <a:rPr lang="en-US" dirty="0" err="1"/>
+              <a:t>Anzahl</a:t>
+            </a:r>
+            <a:r>
+              <a:rPr lang="en-US" dirty="0"/>
+              <a:t> von </a:t>
+            </a:r>
+            <a:r>
+              <a:rPr lang="en-US" dirty="0" err="1"/>
+              <a:t>zufälligen</a:t>
+            </a:r>
+            <a:r>
+              <a:rPr lang="en-US" dirty="0"/>
+              <a:t> Block-</a:t>
+            </a:r>
+            <a:r>
+              <a:rPr lang="en-US" dirty="0" err="1"/>
+              <a:t>Kombinationen</a:t>
+            </a:r>
+            <a:r>
+              <a:rPr lang="en-US" dirty="0"/>
+              <a:t> </a:t>
+            </a:r>
+            <a:r>
+              <a:rPr lang="en-US" dirty="0" err="1"/>
               <a:t>erzeugt</a:t>
             </a:r>
             <a:r>
               <a:rPr lang="en-US" dirty="0"/>
-              <a:t>.</a:t>
+              <a:t>. </a:t>
+            </a:r>
+            <a:r>
+              <a:rPr lang="en-US" dirty="0" err="1"/>
+              <a:t>Jede</a:t>
+            </a:r>
+            <a:r>
+              <a:rPr lang="en-US" dirty="0"/>
+              <a:t> </a:t>
+            </a:r>
+            <a:r>
+              <a:rPr lang="en-US" dirty="0" err="1"/>
+              <a:t>Kombination</a:t>
+            </a:r>
+            <a:r>
+              <a:rPr lang="en-US" dirty="0"/>
+              <a:t> </a:t>
+            </a:r>
+            <a:r>
+              <a:rPr lang="en-US" dirty="0" err="1"/>
+              <a:t>ist</a:t>
+            </a:r>
+            <a:r>
+              <a:rPr lang="en-US" dirty="0"/>
+              <a:t> </a:t>
+            </a:r>
+            <a:r>
+              <a:rPr lang="en-US"/>
+              <a:t>ein </a:t>
+            </a:r>
+            <a:r>
+              <a:rPr lang="en-US" dirty="0"/>
+              <a:t>Individuum.</a:t>
             </a:r>
           </a:p>
         </p:txBody>
@@ -4763,11 +4859,11 @@
             </a:pPr>
             <a:r>
               <a:rPr lang="en-US" dirty="0"/>
-              <a:t>Bei </a:t>
+              <a:t>Für alle </a:t>
             </a:r>
             <a:r>
               <a:rPr lang="en-US" dirty="0" err="1"/>
-              <a:t>allen</a:t>
+              <a:t>Individuen</a:t>
             </a:r>
             <a:r>
               <a:rPr lang="en-US" dirty="0"/>
@@ -4775,7 +4871,7 @@
             </a:r>
             <a:r>
               <a:rPr lang="en-US" dirty="0" err="1"/>
-              <a:t>Individuen</a:t>
+              <a:t>wird</a:t>
             </a:r>
             <a:r>
               <a:rPr lang="en-US" dirty="0"/>
@@ -4783,7 +4879,23 @@
             </a:r>
             <a:r>
               <a:rPr lang="en-US" dirty="0" err="1"/>
-              <a:t>wird</a:t>
+              <a:t>eine</a:t>
+            </a:r>
+            <a:r>
+              <a:rPr lang="en-US" dirty="0"/>
+              <a:t> Fitness </a:t>
+            </a:r>
+            <a:r>
+              <a:rPr lang="en-US" dirty="0" err="1"/>
+              <a:t>berechnet</a:t>
+            </a:r>
+            <a:r>
+              <a:rPr lang="en-US" dirty="0"/>
+              <a:t>, die </a:t>
+            </a:r>
+            <a:r>
+              <a:rPr lang="en-US" dirty="0" err="1"/>
+              <a:t>angibt</a:t>
             </a:r>
             <a:r>
               <a:rPr lang="en-US" dirty="0"/>
@@ -4791,23 +4903,15 @@
             </a:r>
             <a:r>
               <a:rPr lang="en-US" dirty="0" err="1"/>
+              <a:t>wie</a:t>
+            </a:r>
+            <a:r>
+              <a:rPr lang="en-US" dirty="0"/>
+              <a:t> gut </a:t>
+            </a:r>
+            <a:r>
+              <a:rPr lang="en-US" dirty="0" err="1"/>
               <a:t>eine</a:t>
-            </a:r>
-            <a:r>
-              <a:rPr lang="en-US" dirty="0"/>
-              <a:t> Fitness </a:t>
-            </a:r>
-            <a:r>
-              <a:rPr lang="en-US" dirty="0" err="1"/>
-              <a:t>berechnet</a:t>
-            </a:r>
-            <a:r>
-              <a:rPr lang="en-US" dirty="0"/>
-              <a:t>, die </a:t>
-            </a:r>
-            <a:r>
-              <a:rPr lang="en-US" dirty="0" err="1"/>
-              <a:t>angibt</a:t>
             </a:r>
             <a:r>
               <a:rPr lang="en-US" dirty="0"/>
@@ -4815,15 +4919,7 @@
             </a:r>
             <a:r>
               <a:rPr lang="en-US" dirty="0" err="1"/>
-              <a:t>wie</a:t>
-            </a:r>
-            <a:r>
-              <a:rPr lang="en-US" dirty="0"/>
-              <a:t> gut </a:t>
-            </a:r>
-            <a:r>
-              <a:rPr lang="en-US" dirty="0" err="1"/>
-              <a:t>eine</a:t>
+              <a:t>bestimmte</a:t>
             </a:r>
             <a:r>
               <a:rPr lang="en-US" dirty="0"/>
@@ -4831,7 +4927,7 @@
             </a:r>
             <a:r>
               <a:rPr lang="en-US" dirty="0" err="1"/>
-              <a:t>bestimmte</a:t>
+              <a:t>Komination</a:t>
             </a:r>
             <a:r>
               <a:rPr lang="en-US" dirty="0"/>
@@ -4839,7 +4935,15 @@
             </a:r>
             <a:r>
               <a:rPr lang="en-US" dirty="0" err="1"/>
-              <a:t>Komination</a:t>
+              <a:t>ist</a:t>
+            </a:r>
+            <a:r>
+              <a:rPr lang="en-US" dirty="0"/>
+              <a:t>. In </a:t>
+            </a:r>
+            <a:r>
+              <a:rPr lang="en-US" dirty="0" err="1"/>
+              <a:t>diesem</a:t>
             </a:r>
             <a:r>
               <a:rPr lang="en-US" dirty="0"/>
@@ -4847,15 +4951,7 @@
             </a:r>
             <a:r>
               <a:rPr lang="en-US" dirty="0" err="1"/>
-              <a:t>ist</a:t>
-            </a:r>
-            <a:r>
-              <a:rPr lang="en-US" dirty="0"/>
-              <a:t>. In </a:t>
-            </a:r>
-            <a:r>
-              <a:rPr lang="en-US" dirty="0" err="1"/>
-              <a:t>diesen</a:t>
+              <a:t>Beispiel</a:t>
             </a:r>
             <a:r>
               <a:rPr lang="en-US" dirty="0"/>
@@ -4863,7 +4959,15 @@
             </a:r>
             <a:r>
               <a:rPr lang="en-US" dirty="0" err="1"/>
-              <a:t>Beispiel</a:t>
+              <a:t>ist</a:t>
+            </a:r>
+            <a:r>
+              <a:rPr lang="en-US" dirty="0"/>
+              <a:t> die Fitness die </a:t>
+            </a:r>
+            <a:r>
+              <a:rPr lang="en-US" dirty="0" err="1"/>
+              <a:t>prozentuale</a:t>
             </a:r>
             <a:r>
               <a:rPr lang="en-US" dirty="0"/>
@@ -4871,27 +4975,11 @@
             </a:r>
             <a:r>
               <a:rPr lang="en-US" dirty="0" err="1"/>
-              <a:t>ist</a:t>
+              <a:t>Auslastung</a:t>
             </a:r>
             <a:r>
               <a:rPr lang="en-US" dirty="0"/>
-              <a:t> die Fitness die </a:t>
-            </a:r>
-            <a:r>
-              <a:rPr lang="en-US" dirty="0" err="1"/>
-              <a:t>prozentuale</a:t>
-            </a:r>
-            <a:r>
-              <a:rPr lang="en-US" dirty="0"/>
-              <a:t> </a:t>
-            </a:r>
-            <a:r>
-              <a:rPr lang="en-US" dirty="0" err="1"/>
-              <a:t>Auslastung</a:t>
-            </a:r>
-            <a:r>
-              <a:rPr lang="en-US" dirty="0"/>
-              <a:t> der Tasche-</a:t>
+              <a:t> der Tasche.</a:t>
             </a:r>
           </a:p>
         </p:txBody>
@@ -4911,7 +4999,7 @@
         <p:spPr>
           <a:xfrm>
             <a:off x="5804018" y="3925975"/>
-            <a:ext cx="5774088" cy="646331"/>
+            <a:ext cx="5575180" cy="646331"/>
           </a:xfrm>
           <a:prstGeom prst="rect">
             <a:avLst/>
@@ -4942,7 +5030,7 @@
             </a:r>
             <a:r>
               <a:rPr lang="en-US" dirty="0"/>
-              <a:t>, </a:t>
+              <a:t> </a:t>
             </a:r>
             <a:r>
               <a:rPr lang="en-US" dirty="0" err="1"/>
@@ -5073,7 +5161,7 @@
         <p:spPr>
           <a:xfrm>
             <a:off x="5804018" y="6067426"/>
-            <a:ext cx="5774088" cy="646331"/>
+            <a:ext cx="5575180" cy="646331"/>
           </a:xfrm>
           <a:prstGeom prst="rect">
             <a:avLst/>
@@ -5091,44 +5179,14 @@
               <a:buChar char="Ø"/>
             </a:pPr>
             <a:r>
-              <a:rPr lang="en-US" dirty="0"/>
-              <a:t>Die </a:t>
-            </a:r>
-            <a:r>
-              <a:rPr lang="en-US" dirty="0" err="1"/>
-              <a:t>genetische</a:t>
-            </a:r>
-            <a:r>
-              <a:rPr lang="en-US" dirty="0"/>
-              <a:t> Information </a:t>
-            </a:r>
-            <a:r>
-              <a:rPr lang="en-US" dirty="0" err="1"/>
-              <a:t>wird</a:t>
-            </a:r>
-            <a:r>
-              <a:rPr lang="en-US" dirty="0"/>
-              <a:t> an </a:t>
-            </a:r>
-            <a:r>
-              <a:rPr lang="en-US" dirty="0" err="1"/>
-              <a:t>einer</a:t>
-            </a:r>
-            <a:r>
-              <a:rPr lang="en-US" dirty="0"/>
-              <a:t> </a:t>
-            </a:r>
-            <a:r>
-              <a:rPr lang="en-US" dirty="0" err="1"/>
-              <a:t>zufälligen</a:t>
-            </a:r>
-            <a:r>
-              <a:rPr lang="en-US" dirty="0"/>
-              <a:t> Stelle </a:t>
-            </a:r>
-            <a:r>
-              <a:rPr lang="en-US" dirty="0" err="1"/>
-              <a:t>mutiert</a:t>
+              <a:rPr lang="de-DE" b="0" i="0" dirty="0">
+                <a:solidFill>
+                  <a:srgbClr val="0D0D0D"/>
+                </a:solidFill>
+                <a:effectLst/>
+                <a:latin typeface="Söhne"/>
+              </a:rPr>
+              <a:t>An einer zufälligen Stelle wird die genetische Information mutiert.</a:t>
             </a:r>
             <a:endParaRPr lang="en-US" dirty="0"/>
           </a:p>

</xml_diff>